<commit_message>
Update presentation to visualize the pipeline with a new infographic
Replaces text-based pipeline cards with a generated infographic on slide 2 of the PowerPoint presentation.

Replit-Commit-Author: Agent
Replit-Commit-Session-Id: 033c092b-3e73-4141-9bbe-6972d8095018
Replit-Commit-Checkpoint-Type: full_checkpoint
Replit-Commit-Event-Id: 80826398-4ef2-43d7-a589-86b24c88ecb0
Replit-Commit-Screenshot-Url: https://storage.googleapis.com/screenshot-production-us-central1/1fd474a8-af5a-426b-b7fa-b0803597d682/033c092b-3e73-4141-9bbe-6972d8095018/azuFO5t
Replit-Helium-Checkpoint-Created: true
</commit_message>
<xml_diff>
--- a/Portfolio_Risk_Dashboard_Presentation.pptx
+++ b/Portfolio_Risk_Dashboard_Presentation.pptx
@@ -3732,1040 +3732,54 @@
           </a:p>
         </p:txBody>
       </p:sp>
-      <p:sp>
-        <p:nvSpPr>
-          <p:cNvPr id="5" name="Rounded Rectangle 4"/>
-          <p:cNvSpPr/>
-          <p:nvPr/>
-        </p:nvSpPr>
-        <p:spPr>
-          <a:xfrm>
-            <a:off x="731520" y="2743200"/>
-            <a:ext cx="2011680" cy="1645920"/>
-          </a:xfrm>
-          <a:prstGeom prst="roundRect">
-            <a:avLst>
-              <a:gd name="adj" fmla="val 5000"/>
-            </a:avLst>
-          </a:prstGeom>
-          <a:solidFill>
-            <a:srgbClr val="FFFFFF"/>
-          </a:solidFill>
-          <a:ln>
-            <a:noFill/>
-          </a:ln>
-        </p:spPr>
-        <p:style>
-          <a:lnRef idx="1">
-            <a:schemeClr val="accent1"/>
-          </a:lnRef>
-          <a:fillRef idx="3">
-            <a:schemeClr val="accent1"/>
-          </a:fillRef>
-          <a:effectRef idx="2">
-            <a:schemeClr val="accent1"/>
-          </a:effectRef>
-          <a:fontRef idx="minor">
-            <a:schemeClr val="lt1"/>
-          </a:fontRef>
-        </p:style>
-        <p:txBody>
-          <a:bodyPr rtlCol="0" anchor="ctr"/>
-          <a:lstStyle/>
-          <a:p>
-            <a:pPr algn="ctr"/>
-          </a:p>
-        </p:txBody>
-      </p:sp>
-      <p:sp>
-        <p:nvSpPr>
-          <p:cNvPr id="6" name="Rounded Rectangle 5"/>
-          <p:cNvSpPr/>
-          <p:nvPr/>
-        </p:nvSpPr>
-        <p:spPr>
-          <a:xfrm>
-            <a:off x="1005840" y="3017520"/>
-            <a:ext cx="548640" cy="548640"/>
-          </a:xfrm>
-          <a:prstGeom prst="roundRect">
-            <a:avLst>
-              <a:gd name="adj" fmla="val 15000"/>
-            </a:avLst>
-          </a:prstGeom>
-          <a:solidFill>
-            <a:srgbClr val="0EA5E9"/>
-          </a:solidFill>
-          <a:ln>
-            <a:noFill/>
-          </a:ln>
-        </p:spPr>
-        <p:style>
-          <a:lnRef idx="1">
-            <a:schemeClr val="accent1"/>
-          </a:lnRef>
-          <a:fillRef idx="3">
-            <a:schemeClr val="accent1"/>
-          </a:fillRef>
-          <a:effectRef idx="2">
-            <a:schemeClr val="accent1"/>
-          </a:effectRef>
-          <a:fontRef idx="minor">
-            <a:schemeClr val="lt1"/>
-          </a:fontRef>
-        </p:style>
-        <p:txBody>
-          <a:bodyPr rtlCol="0" anchor="ctr"/>
-          <a:lstStyle/>
-          <a:p>
-            <a:pPr algn="ctr"/>
-          </a:p>
-        </p:txBody>
-      </p:sp>
-      <p:sp>
-        <p:nvSpPr>
-          <p:cNvPr id="7" name="TextBox 6"/>
-          <p:cNvSpPr txBox="1"/>
-          <p:nvPr/>
-        </p:nvSpPr>
-        <p:spPr>
-          <a:xfrm>
-            <a:off x="1005840" y="3017520"/>
-            <a:ext cx="548640" cy="548640"/>
-          </a:xfrm>
-          <a:prstGeom prst="rect">
-            <a:avLst/>
-          </a:prstGeom>
-          <a:noFill/>
-        </p:spPr>
-        <p:txBody>
-          <a:bodyPr wrap="square">
-            <a:spAutoFit/>
-          </a:bodyPr>
-          <a:lstStyle/>
-          <a:p>
-            <a:pPr algn="ctr">
-              <a:defRPr sz="2000" b="1">
-                <a:solidFill>
-                  <a:srgbClr val="FFFFFF"/>
-                </a:solidFill>
-                <a:latin typeface="Calibri"/>
-              </a:defRPr>
-            </a:pPr>
-            <a:r>
-              <a:t>1</a:t>
-            </a:r>
-          </a:p>
-        </p:txBody>
-      </p:sp>
-      <p:sp>
-        <p:nvSpPr>
-          <p:cNvPr id="8" name="TextBox 7"/>
-          <p:cNvSpPr txBox="1"/>
-          <p:nvPr/>
-        </p:nvSpPr>
-        <p:spPr>
-          <a:xfrm>
-            <a:off x="1737360" y="2971800"/>
-            <a:ext cx="731520" cy="365760"/>
-          </a:xfrm>
-          <a:prstGeom prst="rect">
-            <a:avLst/>
-          </a:prstGeom>
-          <a:noFill/>
-        </p:spPr>
-        <p:txBody>
-          <a:bodyPr wrap="square">
-            <a:spAutoFit/>
-          </a:bodyPr>
-          <a:lstStyle/>
-          <a:p>
-            <a:pPr algn="l">
-              <a:defRPr sz="1600" b="1">
-                <a:solidFill>
-                  <a:srgbClr val="0F172A"/>
-                </a:solidFill>
-                <a:latin typeface="Calibri"/>
-              </a:defRPr>
-            </a:pPr>
-            <a:r>
-              <a:t>Data Ingestion</a:t>
-            </a:r>
-          </a:p>
-        </p:txBody>
-      </p:sp>
-      <p:sp>
-        <p:nvSpPr>
-          <p:cNvPr id="9" name="TextBox 8"/>
-          <p:cNvSpPr txBox="1"/>
-          <p:nvPr/>
-        </p:nvSpPr>
-        <p:spPr>
-          <a:xfrm>
-            <a:off x="1737360" y="3337560"/>
-            <a:ext cx="731520" cy="822960"/>
-          </a:xfrm>
-          <a:prstGeom prst="rect">
-            <a:avLst/>
-          </a:prstGeom>
-          <a:noFill/>
-        </p:spPr>
-        <p:txBody>
-          <a:bodyPr wrap="square">
-            <a:spAutoFit/>
-          </a:bodyPr>
-          <a:lstStyle/>
-          <a:p>
-            <a:pPr algn="l">
-              <a:defRPr sz="1300" b="0">
-                <a:solidFill>
-                  <a:srgbClr val="64748B"/>
-                </a:solidFill>
-                <a:latin typeface="Calibri"/>
-              </a:defRPr>
-            </a:pPr>
-            <a:r>
-              <a:t>Simulated Bloomberg feed</a:t>
-            </a:r>
-            <a:br/>
-            <a:r>
-              <a:t>with full market data</a:t>
-            </a:r>
-          </a:p>
-        </p:txBody>
-      </p:sp>
-      <p:sp>
-        <p:nvSpPr>
-          <p:cNvPr id="10" name="Rounded Rectangle 9"/>
-          <p:cNvSpPr/>
-          <p:nvPr/>
-        </p:nvSpPr>
-        <p:spPr>
-          <a:xfrm>
-            <a:off x="2971800" y="2743200"/>
-            <a:ext cx="2011680" cy="1645920"/>
-          </a:xfrm>
-          <a:prstGeom prst="roundRect">
-            <a:avLst>
-              <a:gd name="adj" fmla="val 5000"/>
-            </a:avLst>
-          </a:prstGeom>
-          <a:solidFill>
-            <a:srgbClr val="FFFFFF"/>
-          </a:solidFill>
-          <a:ln>
-            <a:noFill/>
-          </a:ln>
-        </p:spPr>
-        <p:style>
-          <a:lnRef idx="1">
-            <a:schemeClr val="accent1"/>
-          </a:lnRef>
-          <a:fillRef idx="3">
-            <a:schemeClr val="accent1"/>
-          </a:fillRef>
-          <a:effectRef idx="2">
-            <a:schemeClr val="accent1"/>
-          </a:effectRef>
-          <a:fontRef idx="minor">
-            <a:schemeClr val="lt1"/>
-          </a:fontRef>
-        </p:style>
-        <p:txBody>
-          <a:bodyPr rtlCol="0" anchor="ctr"/>
-          <a:lstStyle/>
-          <a:p>
-            <a:pPr algn="ctr"/>
-          </a:p>
-        </p:txBody>
-      </p:sp>
-      <p:sp>
-        <p:nvSpPr>
-          <p:cNvPr id="11" name="Rounded Rectangle 10"/>
-          <p:cNvSpPr/>
-          <p:nvPr/>
-        </p:nvSpPr>
-        <p:spPr>
-          <a:xfrm>
-            <a:off x="3246120" y="3017520"/>
-            <a:ext cx="548640" cy="548640"/>
-          </a:xfrm>
-          <a:prstGeom prst="roundRect">
-            <a:avLst>
-              <a:gd name="adj" fmla="val 15000"/>
-            </a:avLst>
-          </a:prstGeom>
-          <a:solidFill>
-            <a:srgbClr val="8B5CF6"/>
-          </a:solidFill>
-          <a:ln>
-            <a:noFill/>
-          </a:ln>
-        </p:spPr>
-        <p:style>
-          <a:lnRef idx="1">
-            <a:schemeClr val="accent1"/>
-          </a:lnRef>
-          <a:fillRef idx="3">
-            <a:schemeClr val="accent1"/>
-          </a:fillRef>
-          <a:effectRef idx="2">
-            <a:schemeClr val="accent1"/>
-          </a:effectRef>
-          <a:fontRef idx="minor">
-            <a:schemeClr val="lt1"/>
-          </a:fontRef>
-        </p:style>
-        <p:txBody>
-          <a:bodyPr rtlCol="0" anchor="ctr"/>
-          <a:lstStyle/>
-          <a:p>
-            <a:pPr algn="ctr"/>
-          </a:p>
-        </p:txBody>
-      </p:sp>
-      <p:sp>
-        <p:nvSpPr>
-          <p:cNvPr id="12" name="TextBox 11"/>
-          <p:cNvSpPr txBox="1"/>
-          <p:nvPr/>
-        </p:nvSpPr>
-        <p:spPr>
-          <a:xfrm>
-            <a:off x="3246120" y="3017520"/>
-            <a:ext cx="548640" cy="548640"/>
-          </a:xfrm>
-          <a:prstGeom prst="rect">
-            <a:avLst/>
-          </a:prstGeom>
-          <a:noFill/>
-        </p:spPr>
-        <p:txBody>
-          <a:bodyPr wrap="square">
-            <a:spAutoFit/>
-          </a:bodyPr>
-          <a:lstStyle/>
-          <a:p>
-            <a:pPr algn="ctr">
-              <a:defRPr sz="2000" b="1">
-                <a:solidFill>
-                  <a:srgbClr val="FFFFFF"/>
-                </a:solidFill>
-                <a:latin typeface="Calibri"/>
-              </a:defRPr>
-            </a:pPr>
-            <a:r>
-              <a:t>2</a:t>
-            </a:r>
-          </a:p>
-        </p:txBody>
-      </p:sp>
-      <p:sp>
-        <p:nvSpPr>
-          <p:cNvPr id="13" name="TextBox 12"/>
-          <p:cNvSpPr txBox="1"/>
-          <p:nvPr/>
-        </p:nvSpPr>
-        <p:spPr>
-          <a:xfrm>
-            <a:off x="3977640" y="2971800"/>
-            <a:ext cx="731520" cy="365760"/>
-          </a:xfrm>
-          <a:prstGeom prst="rect">
-            <a:avLst/>
-          </a:prstGeom>
-          <a:noFill/>
-        </p:spPr>
-        <p:txBody>
-          <a:bodyPr wrap="square">
-            <a:spAutoFit/>
-          </a:bodyPr>
-          <a:lstStyle/>
-          <a:p>
-            <a:pPr algn="l">
-              <a:defRPr sz="1600" b="1">
-                <a:solidFill>
-                  <a:srgbClr val="0F172A"/>
-                </a:solidFill>
-                <a:latin typeface="Calibri"/>
-              </a:defRPr>
-            </a:pPr>
-            <a:r>
-              <a:t>Core Risk Analysis</a:t>
-            </a:r>
-          </a:p>
-        </p:txBody>
-      </p:sp>
-      <p:sp>
-        <p:nvSpPr>
-          <p:cNvPr id="14" name="TextBox 13"/>
-          <p:cNvSpPr txBox="1"/>
-          <p:nvPr/>
-        </p:nvSpPr>
-        <p:spPr>
-          <a:xfrm>
-            <a:off x="3977640" y="3337560"/>
-            <a:ext cx="731520" cy="822960"/>
-          </a:xfrm>
-          <a:prstGeom prst="rect">
-            <a:avLst/>
-          </a:prstGeom>
-          <a:noFill/>
-        </p:spPr>
-        <p:txBody>
-          <a:bodyPr wrap="square">
-            <a:spAutoFit/>
-          </a:bodyPr>
-          <a:lstStyle/>
-          <a:p>
-            <a:pPr algn="l">
-              <a:defRPr sz="1300" b="0">
-                <a:solidFill>
-                  <a:srgbClr val="64748B"/>
-                </a:solidFill>
-                <a:latin typeface="Calibri"/>
-              </a:defRPr>
-            </a:pPr>
-            <a:r>
-              <a:t>7 risk flags, 3 rating tiers</a:t>
-            </a:r>
-            <a:br/>
-            <a:r>
-              <a:t>(RED / YELLOW / GREEN)</a:t>
-            </a:r>
-          </a:p>
-        </p:txBody>
-      </p:sp>
-      <p:sp>
-        <p:nvSpPr>
-          <p:cNvPr id="15" name="Rounded Rectangle 14"/>
-          <p:cNvSpPr/>
-          <p:nvPr/>
-        </p:nvSpPr>
-        <p:spPr>
-          <a:xfrm>
-            <a:off x="5212080" y="2743200"/>
-            <a:ext cx="2011680" cy="1645920"/>
-          </a:xfrm>
-          <a:prstGeom prst="roundRect">
-            <a:avLst>
-              <a:gd name="adj" fmla="val 5000"/>
-            </a:avLst>
-          </a:prstGeom>
-          <a:solidFill>
-            <a:srgbClr val="FFFFFF"/>
-          </a:solidFill>
-          <a:ln>
-            <a:noFill/>
-          </a:ln>
-        </p:spPr>
-        <p:style>
-          <a:lnRef idx="1">
-            <a:schemeClr val="accent1"/>
-          </a:lnRef>
-          <a:fillRef idx="3">
-            <a:schemeClr val="accent1"/>
-          </a:fillRef>
-          <a:effectRef idx="2">
-            <a:schemeClr val="accent1"/>
-          </a:effectRef>
-          <a:fontRef idx="minor">
-            <a:schemeClr val="lt1"/>
-          </a:fontRef>
-        </p:style>
-        <p:txBody>
-          <a:bodyPr rtlCol="0" anchor="ctr"/>
-          <a:lstStyle/>
-          <a:p>
-            <a:pPr algn="ctr"/>
-          </a:p>
-        </p:txBody>
-      </p:sp>
-      <p:sp>
-        <p:nvSpPr>
-          <p:cNvPr id="16" name="Rounded Rectangle 15"/>
-          <p:cNvSpPr/>
-          <p:nvPr/>
-        </p:nvSpPr>
-        <p:spPr>
-          <a:xfrm>
-            <a:off x="5486400" y="3017520"/>
-            <a:ext cx="548640" cy="548640"/>
-          </a:xfrm>
-          <a:prstGeom prst="roundRect">
-            <a:avLst>
-              <a:gd name="adj" fmla="val 15000"/>
-            </a:avLst>
-          </a:prstGeom>
-          <a:solidFill>
-            <a:srgbClr val="F97316"/>
-          </a:solidFill>
-          <a:ln>
-            <a:noFill/>
-          </a:ln>
-        </p:spPr>
-        <p:style>
-          <a:lnRef idx="1">
-            <a:schemeClr val="accent1"/>
-          </a:lnRef>
-          <a:fillRef idx="3">
-            <a:schemeClr val="accent1"/>
-          </a:fillRef>
-          <a:effectRef idx="2">
-            <a:schemeClr val="accent1"/>
-          </a:effectRef>
-          <a:fontRef idx="minor">
-            <a:schemeClr val="lt1"/>
-          </a:fontRef>
-        </p:style>
-        <p:txBody>
-          <a:bodyPr rtlCol="0" anchor="ctr"/>
-          <a:lstStyle/>
-          <a:p>
-            <a:pPr algn="ctr"/>
-          </a:p>
-        </p:txBody>
-      </p:sp>
-      <p:sp>
-        <p:nvSpPr>
-          <p:cNvPr id="17" name="TextBox 16"/>
-          <p:cNvSpPr txBox="1"/>
-          <p:nvPr/>
-        </p:nvSpPr>
-        <p:spPr>
-          <a:xfrm>
-            <a:off x="5486400" y="3017520"/>
-            <a:ext cx="548640" cy="548640"/>
-          </a:xfrm>
-          <a:prstGeom prst="rect">
-            <a:avLst/>
-          </a:prstGeom>
-          <a:noFill/>
-        </p:spPr>
-        <p:txBody>
-          <a:bodyPr wrap="square">
-            <a:spAutoFit/>
-          </a:bodyPr>
-          <a:lstStyle/>
-          <a:p>
-            <a:pPr algn="ctr">
-              <a:defRPr sz="2000" b="1">
-                <a:solidFill>
-                  <a:srgbClr val="FFFFFF"/>
-                </a:solidFill>
-                <a:latin typeface="Calibri"/>
-              </a:defRPr>
-            </a:pPr>
-            <a:r>
-              <a:t>3</a:t>
-            </a:r>
-          </a:p>
-        </p:txBody>
-      </p:sp>
-      <p:sp>
-        <p:nvSpPr>
-          <p:cNvPr id="18" name="TextBox 17"/>
-          <p:cNvSpPr txBox="1"/>
-          <p:nvPr/>
-        </p:nvSpPr>
-        <p:spPr>
-          <a:xfrm>
-            <a:off x="6217920" y="2971800"/>
-            <a:ext cx="731520" cy="365760"/>
-          </a:xfrm>
-          <a:prstGeom prst="rect">
-            <a:avLst/>
-          </a:prstGeom>
-          <a:noFill/>
-        </p:spPr>
-        <p:txBody>
-          <a:bodyPr wrap="square">
-            <a:spAutoFit/>
-          </a:bodyPr>
-          <a:lstStyle/>
-          <a:p>
-            <a:pPr algn="l">
-              <a:defRPr sz="1600" b="1">
-                <a:solidFill>
-                  <a:srgbClr val="0F172A"/>
-                </a:solidFill>
-                <a:latin typeface="Calibri"/>
-              </a:defRPr>
-            </a:pPr>
-            <a:r>
-              <a:t>ML Analysis</a:t>
-            </a:r>
-          </a:p>
-        </p:txBody>
-      </p:sp>
-      <p:sp>
-        <p:nvSpPr>
-          <p:cNvPr id="19" name="TextBox 18"/>
-          <p:cNvSpPr txBox="1"/>
-          <p:nvPr/>
-        </p:nvSpPr>
-        <p:spPr>
-          <a:xfrm>
-            <a:off x="6217920" y="3337560"/>
-            <a:ext cx="731520" cy="822960"/>
-          </a:xfrm>
-          <a:prstGeom prst="rect">
-            <a:avLst/>
-          </a:prstGeom>
-          <a:noFill/>
-        </p:spPr>
-        <p:txBody>
-          <a:bodyPr wrap="square">
-            <a:spAutoFit/>
-          </a:bodyPr>
-          <a:lstStyle/>
-          <a:p>
-            <a:pPr algn="l">
-              <a:defRPr sz="1300" b="0">
-                <a:solidFill>
-                  <a:srgbClr val="64748B"/>
-                </a:solidFill>
-                <a:latin typeface="Calibri"/>
-              </a:defRPr>
-            </a:pPr>
-            <a:r>
-              <a:t>Anomaly detection &amp;</a:t>
-            </a:r>
-            <a:br/>
-            <a:r>
-              <a:t>risk prediction models</a:t>
-            </a:r>
-          </a:p>
-        </p:txBody>
-      </p:sp>
-      <p:sp>
-        <p:nvSpPr>
-          <p:cNvPr id="20" name="Rounded Rectangle 19"/>
-          <p:cNvSpPr/>
-          <p:nvPr/>
-        </p:nvSpPr>
-        <p:spPr>
-          <a:xfrm>
-            <a:off x="7452360" y="2743200"/>
-            <a:ext cx="2011680" cy="1645920"/>
-          </a:xfrm>
-          <a:prstGeom prst="roundRect">
-            <a:avLst>
-              <a:gd name="adj" fmla="val 5000"/>
-            </a:avLst>
-          </a:prstGeom>
-          <a:solidFill>
-            <a:srgbClr val="FFFFFF"/>
-          </a:solidFill>
-          <a:ln>
-            <a:noFill/>
-          </a:ln>
-        </p:spPr>
-        <p:style>
-          <a:lnRef idx="1">
-            <a:schemeClr val="accent1"/>
-          </a:lnRef>
-          <a:fillRef idx="3">
-            <a:schemeClr val="accent1"/>
-          </a:fillRef>
-          <a:effectRef idx="2">
-            <a:schemeClr val="accent1"/>
-          </a:effectRef>
-          <a:fontRef idx="minor">
-            <a:schemeClr val="lt1"/>
-          </a:fontRef>
-        </p:style>
-        <p:txBody>
-          <a:bodyPr rtlCol="0" anchor="ctr"/>
-          <a:lstStyle/>
-          <a:p>
-            <a:pPr algn="ctr"/>
-          </a:p>
-        </p:txBody>
-      </p:sp>
-      <p:sp>
-        <p:nvSpPr>
-          <p:cNvPr id="21" name="Rounded Rectangle 20"/>
-          <p:cNvSpPr/>
-          <p:nvPr/>
-        </p:nvSpPr>
-        <p:spPr>
-          <a:xfrm>
-            <a:off x="7726680" y="3017520"/>
-            <a:ext cx="548640" cy="548640"/>
-          </a:xfrm>
-          <a:prstGeom prst="roundRect">
-            <a:avLst>
-              <a:gd name="adj" fmla="val 15000"/>
-            </a:avLst>
-          </a:prstGeom>
-          <a:solidFill>
-            <a:srgbClr val="10B981"/>
-          </a:solidFill>
-          <a:ln>
-            <a:noFill/>
-          </a:ln>
-        </p:spPr>
-        <p:style>
-          <a:lnRef idx="1">
-            <a:schemeClr val="accent1"/>
-          </a:lnRef>
-          <a:fillRef idx="3">
-            <a:schemeClr val="accent1"/>
-          </a:fillRef>
-          <a:effectRef idx="2">
-            <a:schemeClr val="accent1"/>
-          </a:effectRef>
-          <a:fontRef idx="minor">
-            <a:schemeClr val="lt1"/>
-          </a:fontRef>
-        </p:style>
-        <p:txBody>
-          <a:bodyPr rtlCol="0" anchor="ctr"/>
-          <a:lstStyle/>
-          <a:p>
-            <a:pPr algn="ctr"/>
-          </a:p>
-        </p:txBody>
-      </p:sp>
-      <p:sp>
-        <p:nvSpPr>
-          <p:cNvPr id="22" name="TextBox 21"/>
-          <p:cNvSpPr txBox="1"/>
-          <p:nvPr/>
-        </p:nvSpPr>
-        <p:spPr>
-          <a:xfrm>
-            <a:off x="7726680" y="3017520"/>
-            <a:ext cx="548640" cy="548640"/>
-          </a:xfrm>
-          <a:prstGeom prst="rect">
-            <a:avLst/>
-          </a:prstGeom>
-          <a:noFill/>
-        </p:spPr>
-        <p:txBody>
-          <a:bodyPr wrap="square">
-            <a:spAutoFit/>
-          </a:bodyPr>
-          <a:lstStyle/>
-          <a:p>
-            <a:pPr algn="ctr">
-              <a:defRPr sz="2000" b="1">
-                <a:solidFill>
-                  <a:srgbClr val="FFFFFF"/>
-                </a:solidFill>
-                <a:latin typeface="Calibri"/>
-              </a:defRPr>
-            </a:pPr>
-            <a:r>
-              <a:t>4</a:t>
-            </a:r>
-          </a:p>
-        </p:txBody>
-      </p:sp>
-      <p:sp>
-        <p:nvSpPr>
-          <p:cNvPr id="23" name="TextBox 22"/>
-          <p:cNvSpPr txBox="1"/>
-          <p:nvPr/>
-        </p:nvSpPr>
-        <p:spPr>
-          <a:xfrm>
-            <a:off x="8458200" y="2971800"/>
-            <a:ext cx="731520" cy="365760"/>
-          </a:xfrm>
-          <a:prstGeom prst="rect">
-            <a:avLst/>
-          </a:prstGeom>
-          <a:noFill/>
-        </p:spPr>
-        <p:txBody>
-          <a:bodyPr wrap="square">
-            <a:spAutoFit/>
-          </a:bodyPr>
-          <a:lstStyle/>
-          <a:p>
-            <a:pPr algn="l">
-              <a:defRPr sz="1600" b="1">
-                <a:solidFill>
-                  <a:srgbClr val="0F172A"/>
-                </a:solidFill>
-                <a:latin typeface="Calibri"/>
-              </a:defRPr>
-            </a:pPr>
-            <a:r>
-              <a:t>Sentiment Analysis</a:t>
-            </a:r>
-          </a:p>
-        </p:txBody>
-      </p:sp>
-      <p:sp>
-        <p:nvSpPr>
-          <p:cNvPr id="24" name="TextBox 23"/>
-          <p:cNvSpPr txBox="1"/>
-          <p:nvPr/>
-        </p:nvSpPr>
-        <p:spPr>
-          <a:xfrm>
-            <a:off x="8458200" y="3337560"/>
-            <a:ext cx="731520" cy="822960"/>
-          </a:xfrm>
-          <a:prstGeom prst="rect">
-            <a:avLst/>
-          </a:prstGeom>
-          <a:noFill/>
-        </p:spPr>
-        <p:txBody>
-          <a:bodyPr wrap="square">
-            <a:spAutoFit/>
-          </a:bodyPr>
-          <a:lstStyle/>
-          <a:p>
-            <a:pPr algn="l">
-              <a:defRPr sz="1300" b="0">
-                <a:solidFill>
-                  <a:srgbClr val="64748B"/>
-                </a:solidFill>
-                <a:latin typeface="Calibri"/>
-              </a:defRPr>
-            </a:pPr>
-            <a:r>
-              <a:t>NLP on financial news</a:t>
-            </a:r>
-            <a:br/>
-            <a:r>
-              <a:t>for flagged assets</a:t>
-            </a:r>
-          </a:p>
-        </p:txBody>
-      </p:sp>
-      <p:sp>
-        <p:nvSpPr>
-          <p:cNvPr id="25" name="Rounded Rectangle 24"/>
-          <p:cNvSpPr/>
-          <p:nvPr/>
-        </p:nvSpPr>
-        <p:spPr>
-          <a:xfrm>
-            <a:off x="9692640" y="2743200"/>
-            <a:ext cx="2011680" cy="1645920"/>
-          </a:xfrm>
-          <a:prstGeom prst="roundRect">
-            <a:avLst>
-              <a:gd name="adj" fmla="val 5000"/>
-            </a:avLst>
-          </a:prstGeom>
-          <a:solidFill>
-            <a:srgbClr val="FFFFFF"/>
-          </a:solidFill>
-          <a:ln>
-            <a:noFill/>
-          </a:ln>
-        </p:spPr>
-        <p:style>
-          <a:lnRef idx="1">
-            <a:schemeClr val="accent1"/>
-          </a:lnRef>
-          <a:fillRef idx="3">
-            <a:schemeClr val="accent1"/>
-          </a:fillRef>
-          <a:effectRef idx="2">
-            <a:schemeClr val="accent1"/>
-          </a:effectRef>
-          <a:fontRef idx="minor">
-            <a:schemeClr val="lt1"/>
-          </a:fontRef>
-        </p:style>
-        <p:txBody>
-          <a:bodyPr rtlCol="0" anchor="ctr"/>
-          <a:lstStyle/>
-          <a:p>
-            <a:pPr algn="ctr"/>
-          </a:p>
-        </p:txBody>
-      </p:sp>
-      <p:sp>
-        <p:nvSpPr>
-          <p:cNvPr id="26" name="Rounded Rectangle 25"/>
-          <p:cNvSpPr/>
-          <p:nvPr/>
-        </p:nvSpPr>
-        <p:spPr>
-          <a:xfrm>
-            <a:off x="9966960" y="3017520"/>
-            <a:ext cx="548640" cy="548640"/>
-          </a:xfrm>
-          <a:prstGeom prst="roundRect">
-            <a:avLst>
-              <a:gd name="adj" fmla="val 15000"/>
-            </a:avLst>
-          </a:prstGeom>
-          <a:solidFill>
-            <a:srgbClr val="F43F5E"/>
-          </a:solidFill>
-          <a:ln>
-            <a:noFill/>
-          </a:ln>
-        </p:spPr>
-        <p:style>
-          <a:lnRef idx="1">
-            <a:schemeClr val="accent1"/>
-          </a:lnRef>
-          <a:fillRef idx="3">
-            <a:schemeClr val="accent1"/>
-          </a:fillRef>
-          <a:effectRef idx="2">
-            <a:schemeClr val="accent1"/>
-          </a:effectRef>
-          <a:fontRef idx="minor">
-            <a:schemeClr val="lt1"/>
-          </a:fontRef>
-        </p:style>
-        <p:txBody>
-          <a:bodyPr rtlCol="0" anchor="ctr"/>
-          <a:lstStyle/>
-          <a:p>
-            <a:pPr algn="ctr"/>
-          </a:p>
-        </p:txBody>
-      </p:sp>
-      <p:sp>
-        <p:nvSpPr>
-          <p:cNvPr id="27" name="TextBox 26"/>
-          <p:cNvSpPr txBox="1"/>
-          <p:nvPr/>
-        </p:nvSpPr>
-        <p:spPr>
-          <a:xfrm>
-            <a:off x="9966960" y="3017520"/>
-            <a:ext cx="548640" cy="548640"/>
-          </a:xfrm>
-          <a:prstGeom prst="rect">
-            <a:avLst/>
-          </a:prstGeom>
-          <a:noFill/>
-        </p:spPr>
-        <p:txBody>
-          <a:bodyPr wrap="square">
-            <a:spAutoFit/>
-          </a:bodyPr>
-          <a:lstStyle/>
-          <a:p>
-            <a:pPr algn="ctr">
-              <a:defRPr sz="2000" b="1">
-                <a:solidFill>
-                  <a:srgbClr val="FFFFFF"/>
-                </a:solidFill>
-                <a:latin typeface="Calibri"/>
-              </a:defRPr>
-            </a:pPr>
-            <a:r>
-              <a:t>5</a:t>
-            </a:r>
-          </a:p>
-        </p:txBody>
-      </p:sp>
-      <p:sp>
-        <p:nvSpPr>
-          <p:cNvPr id="28" name="TextBox 27"/>
-          <p:cNvSpPr txBox="1"/>
-          <p:nvPr/>
-        </p:nvSpPr>
-        <p:spPr>
-          <a:xfrm>
-            <a:off x="10698480" y="2971800"/>
-            <a:ext cx="731520" cy="365760"/>
-          </a:xfrm>
-          <a:prstGeom prst="rect">
-            <a:avLst/>
-          </a:prstGeom>
-          <a:noFill/>
-        </p:spPr>
-        <p:txBody>
-          <a:bodyPr wrap="square">
-            <a:spAutoFit/>
-          </a:bodyPr>
-          <a:lstStyle/>
-          <a:p>
-            <a:pPr algn="l">
-              <a:defRPr sz="1600" b="1">
-                <a:solidFill>
-                  <a:srgbClr val="0F172A"/>
-                </a:solidFill>
-                <a:latin typeface="Calibri"/>
-              </a:defRPr>
-            </a:pPr>
-            <a:r>
-              <a:t>Report Generation</a:t>
-            </a:r>
-          </a:p>
-        </p:txBody>
-      </p:sp>
-      <p:sp>
-        <p:nvSpPr>
-          <p:cNvPr id="29" name="TextBox 28"/>
-          <p:cNvSpPr txBox="1"/>
-          <p:nvPr/>
-        </p:nvSpPr>
-        <p:spPr>
-          <a:xfrm>
-            <a:off x="10698480" y="3337560"/>
-            <a:ext cx="731520" cy="822960"/>
-          </a:xfrm>
-          <a:prstGeom prst="rect">
-            <a:avLst/>
-          </a:prstGeom>
-          <a:noFill/>
-        </p:spPr>
-        <p:txBody>
-          <a:bodyPr wrap="square">
-            <a:spAutoFit/>
-          </a:bodyPr>
-          <a:lstStyle/>
-          <a:p>
-            <a:pPr algn="l">
-              <a:defRPr sz="1300" b="0">
-                <a:solidFill>
-                  <a:srgbClr val="64748B"/>
-                </a:solidFill>
-                <a:latin typeface="Calibri"/>
-              </a:defRPr>
-            </a:pPr>
-            <a:r>
-              <a:t>PDF &amp; CSV exports</a:t>
-            </a:r>
-            <a:br/>
-            <a:r>
-              <a:t>with full audit trail</a:t>
-            </a:r>
-          </a:p>
-        </p:txBody>
-      </p:sp>
-      <p:sp>
-        <p:nvSpPr>
-          <p:cNvPr id="30" name="TextBox 29"/>
-          <p:cNvSpPr txBox="1"/>
-          <p:nvPr/>
-        </p:nvSpPr>
-        <p:spPr>
-          <a:xfrm>
-            <a:off x="731520" y="4846320"/>
-            <a:ext cx="10515600" cy="1371600"/>
-          </a:xfrm>
-          <a:prstGeom prst="rect">
-            <a:avLst/>
-          </a:prstGeom>
-          <a:noFill/>
-        </p:spPr>
-        <p:txBody>
-          <a:bodyPr wrap="square">
-            <a:spAutoFit/>
-          </a:bodyPr>
-          <a:lstStyle/>
-          <a:p>
-            <a:pPr algn="l">
-              <a:defRPr sz="1500" b="0">
+      <p:pic>
+        <p:nvPicPr>
+          <p:cNvPr id="5" name="Picture 4" descr="pipeline_diagram.png"/>
+          <p:cNvPicPr>
+            <a:picLocks noChangeAspect="1"/>
+          </p:cNvPicPr>
+          <p:nvPr/>
+        </p:nvPicPr>
+        <p:blipFill>
+          <a:blip r:embed="rId2"/>
+          <a:stretch>
+            <a:fillRect/>
+          </a:stretch>
+        </p:blipFill>
+        <p:spPr>
+          <a:xfrm>
+            <a:off x="731520" y="2560320"/>
+            <a:ext cx="10698480" cy="3383280"/>
+          </a:xfrm>
+          <a:prstGeom prst="rect">
+            <a:avLst/>
+          </a:prstGeom>
+        </p:spPr>
+      </p:pic>
+      <p:sp>
+        <p:nvSpPr>
+          <p:cNvPr id="6" name="TextBox 5"/>
+          <p:cNvSpPr txBox="1"/>
+          <p:nvPr/>
+        </p:nvSpPr>
+        <p:spPr>
+          <a:xfrm>
+            <a:off x="731520" y="6126480"/>
+            <a:ext cx="10515600" cy="457200"/>
+          </a:xfrm>
+          <a:prstGeom prst="rect">
+            <a:avLst/>
+          </a:prstGeom>
+          <a:noFill/>
+        </p:spPr>
+        <p:txBody>
+          <a:bodyPr wrap="square">
+            <a:spAutoFit/>
+          </a:bodyPr>
+          <a:lstStyle/>
+          <a:p>
+            <a:pPr>
+              <a:defRPr sz="1400">
                 <a:solidFill>
                   <a:srgbClr val="64748B"/>
                 </a:solidFill>

</xml_diff>

<commit_message>
Rearrange presentation slides and improve business value readability
Update presentation to reorder slides and redesign the Business Value Proposition slide for clarity and visual appeal.

Replit-Commit-Author: Agent
Replit-Commit-Session-Id: 033c092b-3e73-4141-9bbe-6972d8095018
Replit-Commit-Checkpoint-Type: full_checkpoint
Replit-Commit-Event-Id: c055f076-76ac-4c00-8e65-a9d53fd02b68
Replit-Commit-Screenshot-Url: https://storage.googleapis.com/screenshot-production-us-central1/1fd474a8-af5a-426b-b7fa-b0803597d682/033c092b-3e73-4141-9bbe-6972d8095018/azuFO5t
Replit-Helium-Checkpoint-Created: true
</commit_message>
<xml_diff>
--- a/Portfolio_Risk_Dashboard_Presentation.pptx
+++ b/Portfolio_Risk_Dashboard_Presentation.pptx
@@ -7,13 +7,13 @@
   <p:sldIdLst>
     <p:sldId id="256" r:id="rId7"/>
     <p:sldId id="257" r:id="rId8"/>
+    <p:sldId id="264" r:id="rId15"/>
     <p:sldId id="258" r:id="rId9"/>
     <p:sldId id="259" r:id="rId10"/>
     <p:sldId id="260" r:id="rId11"/>
     <p:sldId id="261" r:id="rId12"/>
     <p:sldId id="262" r:id="rId13"/>
     <p:sldId id="263" r:id="rId14"/>
-    <p:sldId id="264" r:id="rId15"/>
     <p:sldId id="265" r:id="rId16"/>
   </p:sldIdLst>
   <p:sldSz cx="12191695" cy="6858000" type="screen4x3"/>
@@ -3820,7 +3820,7 @@
       <p:grpSpPr/>
       <p:sp>
         <p:nvSpPr>
-          <p:cNvPr id="2" name="Rounded Rectangle 1"/>
+          <p:cNvPr id="2" name="Rectangle 1"/>
           <p:cNvSpPr/>
           <p:nvPr/>
         </p:nvSpPr>
@@ -3829,7 +3829,7 @@
             <a:off x="0" y="0"/>
             <a:ext cx="12191695" cy="1097280"/>
           </a:xfrm>
-          <a:prstGeom prst="roundRect">
+          <a:prstGeom prst="rect">
             <a:avLst/>
           </a:prstGeom>
           <a:solidFill>
@@ -3899,14 +3899,102 @@
       </p:sp>
       <p:sp>
         <p:nvSpPr>
-          <p:cNvPr id="4" name="TextBox 3"/>
+          <p:cNvPr id="4" name="Rounded Rectangle 3"/>
+          <p:cNvSpPr/>
+          <p:nvPr/>
+        </p:nvSpPr>
+        <p:spPr>
+          <a:xfrm>
+            <a:off x="548640" y="1371600"/>
+            <a:ext cx="5486400" cy="5029200"/>
+          </a:xfrm>
+          <a:prstGeom prst="roundRect">
+            <a:avLst>
+              <a:gd name="adj" fmla="val 3000"/>
+            </a:avLst>
+          </a:prstGeom>
+          <a:solidFill>
+            <a:srgbClr val="FFFFFF"/>
+          </a:solidFill>
+          <a:ln>
+            <a:noFill/>
+          </a:ln>
+        </p:spPr>
+        <p:style>
+          <a:lnRef idx="1">
+            <a:schemeClr val="accent1"/>
+          </a:lnRef>
+          <a:fillRef idx="3">
+            <a:schemeClr val="accent1"/>
+          </a:fillRef>
+          <a:effectRef idx="2">
+            <a:schemeClr val="accent1"/>
+          </a:effectRef>
+          <a:fontRef idx="minor">
+            <a:schemeClr val="lt1"/>
+          </a:fontRef>
+        </p:style>
+        <p:txBody>
+          <a:bodyPr rtlCol="0" anchor="ctr"/>
+          <a:lstStyle/>
+          <a:p>
+            <a:pPr algn="ctr"/>
+          </a:p>
+        </p:txBody>
+      </p:sp>
+      <p:sp>
+        <p:nvSpPr>
+          <p:cNvPr id="5" name="Rectangle 4"/>
+          <p:cNvSpPr/>
+          <p:nvPr/>
+        </p:nvSpPr>
+        <p:spPr>
+          <a:xfrm>
+            <a:off x="548640" y="1371600"/>
+            <a:ext cx="5486400" cy="73152"/>
+          </a:xfrm>
+          <a:prstGeom prst="rect">
+            <a:avLst/>
+          </a:prstGeom>
+          <a:solidFill>
+            <a:srgbClr val="0EA5E9"/>
+          </a:solidFill>
+          <a:ln>
+            <a:noFill/>
+          </a:ln>
+        </p:spPr>
+        <p:style>
+          <a:lnRef idx="1">
+            <a:schemeClr val="accent1"/>
+          </a:lnRef>
+          <a:fillRef idx="3">
+            <a:schemeClr val="accent1"/>
+          </a:fillRef>
+          <a:effectRef idx="2">
+            <a:schemeClr val="accent1"/>
+          </a:effectRef>
+          <a:fontRef idx="minor">
+            <a:schemeClr val="lt1"/>
+          </a:fontRef>
+        </p:style>
+        <p:txBody>
+          <a:bodyPr rtlCol="0" anchor="ctr"/>
+          <a:lstStyle/>
+          <a:p>
+            <a:pPr algn="ctr"/>
+          </a:p>
+        </p:txBody>
+      </p:sp>
+      <p:sp>
+        <p:nvSpPr>
+          <p:cNvPr id="6" name="TextBox 5"/>
           <p:cNvSpPr txBox="1"/>
           <p:nvPr/>
         </p:nvSpPr>
         <p:spPr>
           <a:xfrm>
-            <a:off x="731520" y="1371600"/>
-            <a:ext cx="5029200" cy="457200"/>
+            <a:off x="914400" y="1645920"/>
+            <a:ext cx="4754880" cy="457200"/>
           </a:xfrm>
           <a:prstGeom prst="rect">
             <a:avLst/>
@@ -3935,14 +4023,14 @@
       </p:sp>
       <p:sp>
         <p:nvSpPr>
-          <p:cNvPr id="5" name="TextBox 4"/>
+          <p:cNvPr id="7" name="TextBox 6"/>
           <p:cNvSpPr txBox="1"/>
           <p:nvPr/>
         </p:nvSpPr>
         <p:spPr>
           <a:xfrm>
-            <a:off x="731520" y="1920240"/>
-            <a:ext cx="5029200" cy="4114800"/>
+            <a:off x="914400" y="2286000"/>
+            <a:ext cx="4754880" cy="3840480"/>
           </a:xfrm>
           <a:prstGeom prst="rect">
             <a:avLst/>
@@ -3957,111 +4045,235 @@
           <a:p>
             <a:pPr>
               <a:spcAft>
-                <a:spcPts val="800"/>
+                <a:spcPts val="1000"/>
               </a:spcAft>
-              <a:defRPr sz="1500">
+            </a:pPr>
+            <a:r>
+              <a:rPr sz="1600">
+                <a:latin typeface="Calibri"/>
+              </a:rPr>
+              <a:t>⚡  </a:t>
+            </a:r>
+            <a:r>
+              <a:rPr sz="1400">
                 <a:solidFill>
                   <a:srgbClr val="334155"/>
                 </a:solidFill>
                 <a:latin typeface="Calibri"/>
-              </a:defRPr>
-            </a:pPr>
-            <a:r>
+              </a:rPr>
               <a:t>Instant portfolio-wide risk scoring across all assets</a:t>
             </a:r>
           </a:p>
           <a:p>
             <a:pPr>
               <a:spcAft>
-                <a:spcPts val="800"/>
+                <a:spcPts val="1000"/>
               </a:spcAft>
-              <a:defRPr sz="1500">
+            </a:pPr>
+            <a:r>
+              <a:rPr sz="1600">
+                <a:latin typeface="Calibri"/>
+              </a:rPr>
+              <a:t>🚦  </a:t>
+            </a:r>
+            <a:r>
+              <a:rPr sz="1400">
                 <a:solidFill>
                   <a:srgbClr val="334155"/>
                 </a:solidFill>
                 <a:latin typeface="Calibri"/>
-              </a:defRPr>
-            </a:pPr>
-            <a:r>
-              <a:t>Color-coded risk ratings (RED / YELLOW / GREEN) for quick triage</a:t>
+              </a:rPr>
+              <a:t>Color-coded ratings (RED / YELLOW / GREEN) for quick triage</a:t>
             </a:r>
           </a:p>
           <a:p>
             <a:pPr>
               <a:spcAft>
-                <a:spcPts val="800"/>
+                <a:spcPts val="1000"/>
               </a:spcAft>
-              <a:defRPr sz="1500">
+            </a:pPr>
+            <a:r>
+              <a:rPr sz="1600">
+                <a:latin typeface="Calibri"/>
+              </a:rPr>
+              <a:t>⚙️  </a:t>
+            </a:r>
+            <a:r>
+              <a:rPr sz="1400">
                 <a:solidFill>
                   <a:srgbClr val="334155"/>
                 </a:solidFill>
                 <a:latin typeface="Calibri"/>
-              </a:defRPr>
-            </a:pPr>
-            <a:r>
-              <a:t>Configurable risk thresholds — adjust sensitivity without code changes</a:t>
+              </a:rPr>
+              <a:t>Configurable thresholds — adjust sensitivity without code</a:t>
             </a:r>
           </a:p>
           <a:p>
             <a:pPr>
               <a:spcAft>
-                <a:spcPts val="800"/>
+                <a:spcPts val="1000"/>
               </a:spcAft>
-              <a:defRPr sz="1500">
+            </a:pPr>
+            <a:r>
+              <a:rPr sz="1600">
+                <a:latin typeface="Calibri"/>
+              </a:rPr>
+              <a:t>🔍  </a:t>
+            </a:r>
+            <a:r>
+              <a:rPr sz="1400">
                 <a:solidFill>
                   <a:srgbClr val="334155"/>
                 </a:solidFill>
                 <a:latin typeface="Calibri"/>
-              </a:defRPr>
-            </a:pPr>
-            <a:r>
-              <a:t>Expandable flagged asset rows with full deep-dive details inline</a:t>
+              </a:rPr>
+              <a:t>Expandable flagged asset rows with inline deep-dive details</a:t>
             </a:r>
           </a:p>
           <a:p>
             <a:pPr>
               <a:spcAft>
-                <a:spcPts val="800"/>
+                <a:spcPts val="1000"/>
               </a:spcAft>
-              <a:defRPr sz="1500">
+            </a:pPr>
+            <a:r>
+              <a:rPr sz="1600">
+                <a:latin typeface="Calibri"/>
+              </a:rPr>
+              <a:t>📰  </a:t>
+            </a:r>
+            <a:r>
+              <a:rPr sz="1400">
                 <a:solidFill>
                   <a:srgbClr val="334155"/>
                 </a:solidFill>
                 <a:latin typeface="Calibri"/>
-              </a:defRPr>
-            </a:pPr>
-            <a:r>
+              </a:rPr>
               <a:t>Sentiment analysis surfaces market perception risks early</a:t>
             </a:r>
           </a:p>
           <a:p>
             <a:pPr>
               <a:spcAft>
-                <a:spcPts val="800"/>
+                <a:spcPts val="1000"/>
               </a:spcAft>
-              <a:defRPr sz="1500">
+            </a:pPr>
+            <a:r>
+              <a:rPr sz="1600">
+                <a:latin typeface="Calibri"/>
+              </a:rPr>
+              <a:t>📄  </a:t>
+            </a:r>
+            <a:r>
+              <a:rPr sz="1400">
                 <a:solidFill>
                   <a:srgbClr val="334155"/>
                 </a:solidFill>
                 <a:latin typeface="Calibri"/>
-              </a:defRPr>
-            </a:pPr>
-            <a:r>
-              <a:t>One-click PDF and CSV report generation for compliance &amp; audit</a:t>
-            </a:r>
-          </a:p>
-        </p:txBody>
-      </p:sp>
-      <p:sp>
-        <p:nvSpPr>
-          <p:cNvPr id="6" name="TextBox 5"/>
+              </a:rPr>
+              <a:t>One-click PDF &amp; CSV reports for compliance and audit</a:t>
+            </a:r>
+          </a:p>
+        </p:txBody>
+      </p:sp>
+      <p:sp>
+        <p:nvSpPr>
+          <p:cNvPr id="8" name="Rounded Rectangle 7"/>
+          <p:cNvSpPr/>
+          <p:nvPr/>
+        </p:nvSpPr>
+        <p:spPr>
+          <a:xfrm>
+            <a:off x="6309360" y="1371600"/>
+            <a:ext cx="5486400" cy="5029200"/>
+          </a:xfrm>
+          <a:prstGeom prst="roundRect">
+            <a:avLst>
+              <a:gd name="adj" fmla="val 3000"/>
+            </a:avLst>
+          </a:prstGeom>
+          <a:solidFill>
+            <a:srgbClr val="FFFFFF"/>
+          </a:solidFill>
+          <a:ln>
+            <a:noFill/>
+          </a:ln>
+        </p:spPr>
+        <p:style>
+          <a:lnRef idx="1">
+            <a:schemeClr val="accent1"/>
+          </a:lnRef>
+          <a:fillRef idx="3">
+            <a:schemeClr val="accent1"/>
+          </a:fillRef>
+          <a:effectRef idx="2">
+            <a:schemeClr val="accent1"/>
+          </a:effectRef>
+          <a:fontRef idx="minor">
+            <a:schemeClr val="lt1"/>
+          </a:fontRef>
+        </p:style>
+        <p:txBody>
+          <a:bodyPr rtlCol="0" anchor="ctr"/>
+          <a:lstStyle/>
+          <a:p>
+            <a:pPr algn="ctr"/>
+          </a:p>
+        </p:txBody>
+      </p:sp>
+      <p:sp>
+        <p:nvSpPr>
+          <p:cNvPr id="9" name="Rectangle 8"/>
+          <p:cNvSpPr/>
+          <p:nvPr/>
+        </p:nvSpPr>
+        <p:spPr>
+          <a:xfrm>
+            <a:off x="6309360" y="1371600"/>
+            <a:ext cx="5486400" cy="73152"/>
+          </a:xfrm>
+          <a:prstGeom prst="rect">
+            <a:avLst/>
+          </a:prstGeom>
+          <a:solidFill>
+            <a:srgbClr val="10B981"/>
+          </a:solidFill>
+          <a:ln>
+            <a:noFill/>
+          </a:ln>
+        </p:spPr>
+        <p:style>
+          <a:lnRef idx="1">
+            <a:schemeClr val="accent1"/>
+          </a:lnRef>
+          <a:fillRef idx="3">
+            <a:schemeClr val="accent1"/>
+          </a:fillRef>
+          <a:effectRef idx="2">
+            <a:schemeClr val="accent1"/>
+          </a:effectRef>
+          <a:fontRef idx="minor">
+            <a:schemeClr val="lt1"/>
+          </a:fontRef>
+        </p:style>
+        <p:txBody>
+          <a:bodyPr rtlCol="0" anchor="ctr"/>
+          <a:lstStyle/>
+          <a:p>
+            <a:pPr algn="ctr"/>
+          </a:p>
+        </p:txBody>
+      </p:sp>
+      <p:sp>
+        <p:nvSpPr>
+          <p:cNvPr id="10" name="TextBox 9"/>
           <p:cNvSpPr txBox="1"/>
           <p:nvPr/>
         </p:nvSpPr>
         <p:spPr>
           <a:xfrm>
-            <a:off x="6400800" y="1371600"/>
-            <a:ext cx="5029200" cy="457200"/>
+            <a:off x="6675120" y="1645920"/>
+            <a:ext cx="4754880" cy="457200"/>
           </a:xfrm>
           <a:prstGeom prst="rect">
             <a:avLst/>
@@ -4090,14 +4302,102 @@
       </p:sp>
       <p:sp>
         <p:nvSpPr>
-          <p:cNvPr id="7" name="TextBox 6"/>
+          <p:cNvPr id="11" name="Rounded Rectangle 10"/>
+          <p:cNvSpPr/>
+          <p:nvPr/>
+        </p:nvSpPr>
+        <p:spPr>
+          <a:xfrm>
+            <a:off x="6675120" y="2286000"/>
+            <a:ext cx="1417320" cy="1371600"/>
+          </a:xfrm>
+          <a:prstGeom prst="roundRect">
+            <a:avLst>
+              <a:gd name="adj" fmla="val 6000"/>
+            </a:avLst>
+          </a:prstGeom>
+          <a:solidFill>
+            <a:srgbClr val="F8FAFC"/>
+          </a:solidFill>
+          <a:ln>
+            <a:noFill/>
+          </a:ln>
+        </p:spPr>
+        <p:style>
+          <a:lnRef idx="1">
+            <a:schemeClr val="accent1"/>
+          </a:lnRef>
+          <a:fillRef idx="3">
+            <a:schemeClr val="accent1"/>
+          </a:fillRef>
+          <a:effectRef idx="2">
+            <a:schemeClr val="accent1"/>
+          </a:effectRef>
+          <a:fontRef idx="minor">
+            <a:schemeClr val="lt1"/>
+          </a:fontRef>
+        </p:style>
+        <p:txBody>
+          <a:bodyPr rtlCol="0" anchor="ctr"/>
+          <a:lstStyle/>
+          <a:p>
+            <a:pPr algn="ctr"/>
+          </a:p>
+        </p:txBody>
+      </p:sp>
+      <p:sp>
+        <p:nvSpPr>
+          <p:cNvPr id="12" name="Rectangle 11"/>
+          <p:cNvSpPr/>
+          <p:nvPr/>
+        </p:nvSpPr>
+        <p:spPr>
+          <a:xfrm>
+            <a:off x="6675120" y="2286000"/>
+            <a:ext cx="1417320" cy="54864"/>
+          </a:xfrm>
+          <a:prstGeom prst="rect">
+            <a:avLst/>
+          </a:prstGeom>
+          <a:solidFill>
+            <a:srgbClr val="0EA5E9"/>
+          </a:solidFill>
+          <a:ln>
+            <a:noFill/>
+          </a:ln>
+        </p:spPr>
+        <p:style>
+          <a:lnRef idx="1">
+            <a:schemeClr val="accent1"/>
+          </a:lnRef>
+          <a:fillRef idx="3">
+            <a:schemeClr val="accent1"/>
+          </a:fillRef>
+          <a:effectRef idx="2">
+            <a:schemeClr val="accent1"/>
+          </a:effectRef>
+          <a:fontRef idx="minor">
+            <a:schemeClr val="lt1"/>
+          </a:fontRef>
+        </p:style>
+        <p:txBody>
+          <a:bodyPr rtlCol="0" anchor="ctr"/>
+          <a:lstStyle/>
+          <a:p>
+            <a:pPr algn="ctr"/>
+          </a:p>
+        </p:txBody>
+      </p:sp>
+      <p:sp>
+        <p:nvSpPr>
+          <p:cNvPr id="13" name="TextBox 12"/>
           <p:cNvSpPr txBox="1"/>
           <p:nvPr/>
         </p:nvSpPr>
         <p:spPr>
           <a:xfrm>
-            <a:off x="6400800" y="1920240"/>
-            <a:ext cx="5029200" cy="4114800"/>
+            <a:off x="6675120" y="2468880"/>
+            <a:ext cx="1417320" cy="457200"/>
           </a:xfrm>
           <a:prstGeom prst="rect">
             <a:avLst/>
@@ -4110,99 +4410,495 @@
           </a:bodyPr>
           <a:lstStyle/>
           <a:p>
+            <a:pPr algn="ctr">
+              <a:defRPr sz="2400" b="1">
+                <a:solidFill>
+                  <a:srgbClr val="0EA5E9"/>
+                </a:solidFill>
+                <a:latin typeface="Calibri"/>
+              </a:defRPr>
+            </a:pPr>
+            <a:r>
+              <a:t>90%+</a:t>
+            </a:r>
+          </a:p>
+        </p:txBody>
+      </p:sp>
+      <p:sp>
+        <p:nvSpPr>
+          <p:cNvPr id="14" name="TextBox 13"/>
+          <p:cNvSpPr txBox="1"/>
+          <p:nvPr/>
+        </p:nvSpPr>
+        <p:spPr>
+          <a:xfrm>
+            <a:off x="6675120" y="2971800"/>
+            <a:ext cx="1417320" cy="640080"/>
+          </a:xfrm>
+          <a:prstGeom prst="rect">
+            <a:avLst/>
+          </a:prstGeom>
+          <a:noFill/>
+        </p:spPr>
+        <p:txBody>
+          <a:bodyPr wrap="square">
+            <a:spAutoFit/>
+          </a:bodyPr>
+          <a:lstStyle/>
+          <a:p>
+            <a:pPr algn="ctr">
+              <a:defRPr sz="1100" b="0">
+                <a:solidFill>
+                  <a:srgbClr val="64748B"/>
+                </a:solidFill>
+                <a:latin typeface="Calibri"/>
+              </a:defRPr>
+            </a:pPr>
+            <a:r>
+              <a:t>Reduction in</a:t>
+            </a:r>
+            <a:br/>
+            <a:r>
+              <a:t>manual review time</a:t>
+            </a:r>
+          </a:p>
+        </p:txBody>
+      </p:sp>
+      <p:sp>
+        <p:nvSpPr>
+          <p:cNvPr id="15" name="Rounded Rectangle 14"/>
+          <p:cNvSpPr/>
+          <p:nvPr/>
+        </p:nvSpPr>
+        <p:spPr>
+          <a:xfrm>
+            <a:off x="8275320" y="2286000"/>
+            <a:ext cx="1417320" cy="1371600"/>
+          </a:xfrm>
+          <a:prstGeom prst="roundRect">
+            <a:avLst>
+              <a:gd name="adj" fmla="val 6000"/>
+            </a:avLst>
+          </a:prstGeom>
+          <a:solidFill>
+            <a:srgbClr val="F8FAFC"/>
+          </a:solidFill>
+          <a:ln>
+            <a:noFill/>
+          </a:ln>
+        </p:spPr>
+        <p:style>
+          <a:lnRef idx="1">
+            <a:schemeClr val="accent1"/>
+          </a:lnRef>
+          <a:fillRef idx="3">
+            <a:schemeClr val="accent1"/>
+          </a:fillRef>
+          <a:effectRef idx="2">
+            <a:schemeClr val="accent1"/>
+          </a:effectRef>
+          <a:fontRef idx="minor">
+            <a:schemeClr val="lt1"/>
+          </a:fontRef>
+        </p:style>
+        <p:txBody>
+          <a:bodyPr rtlCol="0" anchor="ctr"/>
+          <a:lstStyle/>
+          <a:p>
+            <a:pPr algn="ctr"/>
+          </a:p>
+        </p:txBody>
+      </p:sp>
+      <p:sp>
+        <p:nvSpPr>
+          <p:cNvPr id="16" name="Rectangle 15"/>
+          <p:cNvSpPr/>
+          <p:nvPr/>
+        </p:nvSpPr>
+        <p:spPr>
+          <a:xfrm>
+            <a:off x="8275320" y="2286000"/>
+            <a:ext cx="1417320" cy="54864"/>
+          </a:xfrm>
+          <a:prstGeom prst="rect">
+            <a:avLst/>
+          </a:prstGeom>
+          <a:solidFill>
+            <a:srgbClr val="8B5CF6"/>
+          </a:solidFill>
+          <a:ln>
+            <a:noFill/>
+          </a:ln>
+        </p:spPr>
+        <p:style>
+          <a:lnRef idx="1">
+            <a:schemeClr val="accent1"/>
+          </a:lnRef>
+          <a:fillRef idx="3">
+            <a:schemeClr val="accent1"/>
+          </a:fillRef>
+          <a:effectRef idx="2">
+            <a:schemeClr val="accent1"/>
+          </a:effectRef>
+          <a:fontRef idx="minor">
+            <a:schemeClr val="lt1"/>
+          </a:fontRef>
+        </p:style>
+        <p:txBody>
+          <a:bodyPr rtlCol="0" anchor="ctr"/>
+          <a:lstStyle/>
+          <a:p>
+            <a:pPr algn="ctr"/>
+          </a:p>
+        </p:txBody>
+      </p:sp>
+      <p:sp>
+        <p:nvSpPr>
+          <p:cNvPr id="17" name="TextBox 16"/>
+          <p:cNvSpPr txBox="1"/>
+          <p:nvPr/>
+        </p:nvSpPr>
+        <p:spPr>
+          <a:xfrm>
+            <a:off x="8275320" y="2468880"/>
+            <a:ext cx="1417320" cy="457200"/>
+          </a:xfrm>
+          <a:prstGeom prst="rect">
+            <a:avLst/>
+          </a:prstGeom>
+          <a:noFill/>
+        </p:spPr>
+        <p:txBody>
+          <a:bodyPr wrap="square">
+            <a:spAutoFit/>
+          </a:bodyPr>
+          <a:lstStyle/>
+          <a:p>
+            <a:pPr algn="ctr">
+              <a:defRPr sz="2400" b="1">
+                <a:solidFill>
+                  <a:srgbClr val="8B5CF6"/>
+                </a:solidFill>
+                <a:latin typeface="Calibri"/>
+              </a:defRPr>
+            </a:pPr>
+            <a:r>
+              <a:t>100%</a:t>
+            </a:r>
+          </a:p>
+        </p:txBody>
+      </p:sp>
+      <p:sp>
+        <p:nvSpPr>
+          <p:cNvPr id="18" name="TextBox 17"/>
+          <p:cNvSpPr txBox="1"/>
+          <p:nvPr/>
+        </p:nvSpPr>
+        <p:spPr>
+          <a:xfrm>
+            <a:off x="8275320" y="2971800"/>
+            <a:ext cx="1417320" cy="640080"/>
+          </a:xfrm>
+          <a:prstGeom prst="rect">
+            <a:avLst/>
+          </a:prstGeom>
+          <a:noFill/>
+        </p:spPr>
+        <p:txBody>
+          <a:bodyPr wrap="square">
+            <a:spAutoFit/>
+          </a:bodyPr>
+          <a:lstStyle/>
+          <a:p>
+            <a:pPr algn="ctr">
+              <a:defRPr sz="1100" b="0">
+                <a:solidFill>
+                  <a:srgbClr val="64748B"/>
+                </a:solidFill>
+                <a:latin typeface="Calibri"/>
+              </a:defRPr>
+            </a:pPr>
+            <a:r>
+              <a:t>Consistent, rule-based</a:t>
+            </a:r>
+            <a:br/>
+            <a:r>
+              <a:t>bias-free analysis</a:t>
+            </a:r>
+          </a:p>
+        </p:txBody>
+      </p:sp>
+      <p:sp>
+        <p:nvSpPr>
+          <p:cNvPr id="19" name="Rounded Rectangle 18"/>
+          <p:cNvSpPr/>
+          <p:nvPr/>
+        </p:nvSpPr>
+        <p:spPr>
+          <a:xfrm>
+            <a:off x="9875520" y="2286000"/>
+            <a:ext cx="1417320" cy="1371600"/>
+          </a:xfrm>
+          <a:prstGeom prst="roundRect">
+            <a:avLst>
+              <a:gd name="adj" fmla="val 6000"/>
+            </a:avLst>
+          </a:prstGeom>
+          <a:solidFill>
+            <a:srgbClr val="F8FAFC"/>
+          </a:solidFill>
+          <a:ln>
+            <a:noFill/>
+          </a:ln>
+        </p:spPr>
+        <p:style>
+          <a:lnRef idx="1">
+            <a:schemeClr val="accent1"/>
+          </a:lnRef>
+          <a:fillRef idx="3">
+            <a:schemeClr val="accent1"/>
+          </a:fillRef>
+          <a:effectRef idx="2">
+            <a:schemeClr val="accent1"/>
+          </a:effectRef>
+          <a:fontRef idx="minor">
+            <a:schemeClr val="lt1"/>
+          </a:fontRef>
+        </p:style>
+        <p:txBody>
+          <a:bodyPr rtlCol="0" anchor="ctr"/>
+          <a:lstStyle/>
+          <a:p>
+            <a:pPr algn="ctr"/>
+          </a:p>
+        </p:txBody>
+      </p:sp>
+      <p:sp>
+        <p:nvSpPr>
+          <p:cNvPr id="20" name="Rectangle 19"/>
+          <p:cNvSpPr/>
+          <p:nvPr/>
+        </p:nvSpPr>
+        <p:spPr>
+          <a:xfrm>
+            <a:off x="9875520" y="2286000"/>
+            <a:ext cx="1417320" cy="54864"/>
+          </a:xfrm>
+          <a:prstGeom prst="rect">
+            <a:avLst/>
+          </a:prstGeom>
+          <a:solidFill>
+            <a:srgbClr val="F97316"/>
+          </a:solidFill>
+          <a:ln>
+            <a:noFill/>
+          </a:ln>
+        </p:spPr>
+        <p:style>
+          <a:lnRef idx="1">
+            <a:schemeClr val="accent1"/>
+          </a:lnRef>
+          <a:fillRef idx="3">
+            <a:schemeClr val="accent1"/>
+          </a:fillRef>
+          <a:effectRef idx="2">
+            <a:schemeClr val="accent1"/>
+          </a:effectRef>
+          <a:fontRef idx="minor">
+            <a:schemeClr val="lt1"/>
+          </a:fontRef>
+        </p:style>
+        <p:txBody>
+          <a:bodyPr rtlCol="0" anchor="ctr"/>
+          <a:lstStyle/>
+          <a:p>
+            <a:pPr algn="ctr"/>
+          </a:p>
+        </p:txBody>
+      </p:sp>
+      <p:sp>
+        <p:nvSpPr>
+          <p:cNvPr id="21" name="TextBox 20"/>
+          <p:cNvSpPr txBox="1"/>
+          <p:nvPr/>
+        </p:nvSpPr>
+        <p:spPr>
+          <a:xfrm>
+            <a:off x="9875520" y="2468880"/>
+            <a:ext cx="1417320" cy="457200"/>
+          </a:xfrm>
+          <a:prstGeom prst="rect">
+            <a:avLst/>
+          </a:prstGeom>
+          <a:noFill/>
+        </p:spPr>
+        <p:txBody>
+          <a:bodyPr wrap="square">
+            <a:spAutoFit/>
+          </a:bodyPr>
+          <a:lstStyle/>
+          <a:p>
+            <a:pPr algn="ctr">
+              <a:defRPr sz="2400" b="1">
+                <a:solidFill>
+                  <a:srgbClr val="F97316"/>
+                </a:solidFill>
+                <a:latin typeface="Calibri"/>
+              </a:defRPr>
+            </a:pPr>
+            <a:r>
+              <a:t>10-100</a:t>
+            </a:r>
+          </a:p>
+        </p:txBody>
+      </p:sp>
+      <p:sp>
+        <p:nvSpPr>
+          <p:cNvPr id="22" name="TextBox 21"/>
+          <p:cNvSpPr txBox="1"/>
+          <p:nvPr/>
+        </p:nvSpPr>
+        <p:spPr>
+          <a:xfrm>
+            <a:off x="9875520" y="2971800"/>
+            <a:ext cx="1417320" cy="640080"/>
+          </a:xfrm>
+          <a:prstGeom prst="rect">
+            <a:avLst/>
+          </a:prstGeom>
+          <a:noFill/>
+        </p:spPr>
+        <p:txBody>
+          <a:bodyPr wrap="square">
+            <a:spAutoFit/>
+          </a:bodyPr>
+          <a:lstStyle/>
+          <a:p>
+            <a:pPr algn="ctr">
+              <a:defRPr sz="1100" b="0">
+                <a:solidFill>
+                  <a:srgbClr val="64748B"/>
+                </a:solidFill>
+                <a:latin typeface="Calibri"/>
+              </a:defRPr>
+            </a:pPr>
+            <a:r>
+              <a:t>Assets analyzed</a:t>
+            </a:r>
+            <a:br/>
+            <a:r>
+              <a:t>per pipeline run</a:t>
+            </a:r>
+          </a:p>
+        </p:txBody>
+      </p:sp>
+      <p:sp>
+        <p:nvSpPr>
+          <p:cNvPr id="23" name="TextBox 22"/>
+          <p:cNvSpPr txBox="1"/>
+          <p:nvPr/>
+        </p:nvSpPr>
+        <p:spPr>
+          <a:xfrm>
+            <a:off x="6675120" y="3931920"/>
+            <a:ext cx="4754880" cy="2286000"/>
+          </a:xfrm>
+          <a:prstGeom prst="rect">
+            <a:avLst/>
+          </a:prstGeom>
+          <a:noFill/>
+        </p:spPr>
+        <p:txBody>
+          <a:bodyPr wrap="square">
+            <a:spAutoFit/>
+          </a:bodyPr>
+          <a:lstStyle/>
+          <a:p>
             <a:pPr>
               <a:spcAft>
-                <a:spcPts val="800"/>
+                <a:spcPts val="1000"/>
               </a:spcAft>
-              <a:defRPr sz="1500">
+            </a:pPr>
+            <a:r>
+              <a:rPr sz="1600">
+                <a:latin typeface="Calibri"/>
+              </a:rPr>
+              <a:t>🧠  </a:t>
+            </a:r>
+            <a:r>
+              <a:rPr sz="1400">
                 <a:solidFill>
                   <a:srgbClr val="334155"/>
                 </a:solidFill>
                 <a:latin typeface="Calibri"/>
-              </a:defRPr>
-            </a:pPr>
-            <a:r>
-              <a:t>Reduces manual review time by 90%+</a:t>
+              </a:rPr>
+              <a:t>ML anomaly detection catches risks human review may miss</a:t>
             </a:r>
           </a:p>
           <a:p>
             <a:pPr>
               <a:spcAft>
-                <a:spcPts val="800"/>
+                <a:spcPts val="1000"/>
               </a:spcAft>
-              <a:defRPr sz="1500">
+            </a:pPr>
+            <a:r>
+              <a:rPr sz="1600">
+                <a:latin typeface="Calibri"/>
+              </a:rPr>
+              <a:t>🔎  </a:t>
+            </a:r>
+            <a:r>
+              <a:rPr sz="1400">
                 <a:solidFill>
                   <a:srgbClr val="334155"/>
                 </a:solidFill>
                 <a:latin typeface="Calibri"/>
-              </a:defRPr>
-            </a:pPr>
-            <a:r>
-              <a:t>Consistent, rule-based analysis eliminates subjective bias</a:t>
+              </a:rPr>
+              <a:t>Full audit trail with methodology transparency</a:t>
             </a:r>
           </a:p>
           <a:p>
             <a:pPr>
               <a:spcAft>
-                <a:spcPts val="800"/>
+                <a:spcPts val="1000"/>
               </a:spcAft>
-              <a:defRPr sz="1500">
+            </a:pPr>
+            <a:r>
+              <a:rPr sz="1600">
+                <a:latin typeface="Calibri"/>
+              </a:rPr>
+              <a:t>📊  </a:t>
+            </a:r>
+            <a:r>
+              <a:rPr sz="1400">
                 <a:solidFill>
                   <a:srgbClr val="334155"/>
                 </a:solidFill>
                 <a:latin typeface="Calibri"/>
-              </a:defRPr>
-            </a:pPr>
-            <a:r>
-              <a:t>ML anomaly detection catches risks human review may miss</a:t>
+              </a:rPr>
+              <a:t>Interactive charts — no more static spreadsheets</a:t>
             </a:r>
           </a:p>
           <a:p>
             <a:pPr>
               <a:spcAft>
-                <a:spcPts val="800"/>
+                <a:spcPts val="1000"/>
               </a:spcAft>
-              <a:defRPr sz="1500">
+            </a:pPr>
+            <a:r>
+              <a:rPr sz="1600">
+                <a:latin typeface="Calibri"/>
+              </a:rPr>
+              <a:t>⏰  </a:t>
+            </a:r>
+            <a:r>
+              <a:rPr sz="1400">
                 <a:solidFill>
                   <a:srgbClr val="334155"/>
                 </a:solidFill>
                 <a:latin typeface="Calibri"/>
-              </a:defRPr>
-            </a:pPr>
-            <a:r>
-              <a:t>Full audit trail with methodology transparency</a:t>
-            </a:r>
-          </a:p>
-          <a:p>
-            <a:pPr>
-              <a:spcAft>
-                <a:spcPts val="800"/>
-              </a:spcAft>
-              <a:defRPr sz="1500">
-                <a:solidFill>
-                  <a:srgbClr val="334155"/>
-                </a:solidFill>
-                <a:latin typeface="Calibri"/>
-              </a:defRPr>
-            </a:pPr>
-            <a:r>
-              <a:t>Scalable from 10 to 100+ assets per run</a:t>
-            </a:r>
-          </a:p>
-          <a:p>
-            <a:pPr>
-              <a:spcAft>
-                <a:spcPts val="800"/>
-              </a:spcAft>
-              <a:defRPr sz="1500">
-                <a:solidFill>
-                  <a:srgbClr val="334155"/>
-                </a:solidFill>
-                <a:latin typeface="Calibri"/>
-              </a:defRPr>
-            </a:pPr>
-            <a:r>
-              <a:t>Interactive dashboard — no spreadsheets needed</a:t>
+              </a:rPr>
+              <a:t>Seconds to run, not hours of manual work</a:t>
             </a:r>
           </a:p>
         </p:txBody>

</xml_diff>